<commit_message>
Altes Layout gelöscht Dauerlauf mit Sprints TTO 01 layout überarbeitet
</commit_message>
<xml_diff>
--- a/agile moves/Teamtool (TTO)/ger_TTO_01_Trainingkarten_gestalten.pptx
+++ b/agile moves/Teamtool (TTO)/ger_TTO_01_Trainingkarten_gestalten.pptx
@@ -193,7 +193,7 @@
           <a:p>
             <a:fld id="{E782CAE3-88C9-904F-BC7F-0B1E5513AFB6}" type="datetimeFigureOut">
               <a:rPr lang="de-DE" smtClean="0"/>
-              <a:t>28.05.15</a:t>
+              <a:t>29.05.15</a:t>
             </a:fld>
             <a:endParaRPr lang="de-DE"/>
           </a:p>
@@ -665,17 +665,17 @@
           <a:lstStyle/>
           <a:p>
             <a:r>
-              <a:rPr lang="de-DE" sz="2400" dirty="0" smtClean="0">
+              <a:rPr lang="de-DE" sz="2400" smtClean="0">
                 <a:solidFill>
                   <a:srgbClr val="1191D1"/>
                 </a:solidFill>
                 <a:latin typeface="Avenir Heavy"/>
                 <a:cs typeface="Avenir Heavy"/>
               </a:rPr>
-              <a:t>TR	AININGS</a:t>
-            </a:r>
-            <a:r>
-              <a:rPr lang="de-DE" sz="2400" dirty="0" smtClean="0">
+              <a:t>TRAININGS</a:t>
+            </a:r>
+            <a:r>
+              <a:rPr lang="de-DE" sz="2400" smtClean="0">
                 <a:solidFill>
                   <a:srgbClr val="1191D1"/>
                 </a:solidFill>
@@ -888,7 +888,7 @@
           <a:p>
             <a:fld id="{FF5B2BAF-DF38-0A48-A798-0C06E514FD52}" type="datetimeFigureOut">
               <a:rPr lang="de-DE" smtClean="0"/>
-              <a:t>28.05.15</a:t>
+              <a:t>29.05.15</a:t>
             </a:fld>
             <a:endParaRPr lang="de-DE" dirty="0"/>
           </a:p>
@@ -973,6 +973,53 @@
       </p:grpSpPr>
       <p:sp>
         <p:nvSpPr>
+          <p:cNvPr id="12" name="Rechteck 11"/>
+          <p:cNvSpPr/>
+          <p:nvPr userDrawn="1"/>
+        </p:nvSpPr>
+        <p:spPr>
+          <a:xfrm>
+            <a:off x="0" y="0"/>
+            <a:ext cx="7562850" cy="5330825"/>
+          </a:xfrm>
+          <a:prstGeom prst="rect">
+            <a:avLst/>
+          </a:prstGeom>
+          <a:noFill/>
+          <a:ln>
+            <a:solidFill>
+              <a:schemeClr val="bg1">
+                <a:lumMod val="75000"/>
+              </a:schemeClr>
+            </a:solidFill>
+          </a:ln>
+          <a:effectLst/>
+        </p:spPr>
+        <p:style>
+          <a:lnRef idx="1">
+            <a:schemeClr val="accent1"/>
+          </a:lnRef>
+          <a:fillRef idx="3">
+            <a:schemeClr val="accent1"/>
+          </a:fillRef>
+          <a:effectRef idx="2">
+            <a:schemeClr val="accent1"/>
+          </a:effectRef>
+          <a:fontRef idx="minor">
+            <a:schemeClr val="lt1"/>
+          </a:fontRef>
+        </p:style>
+        <p:txBody>
+          <a:bodyPr rtlCol="0" anchor="ctr"/>
+          <a:lstStyle/>
+          <a:p>
+            <a:pPr algn="ctr"/>
+            <a:endParaRPr lang="de-DE"/>
+          </a:p>
+        </p:txBody>
+      </p:sp>
+      <p:sp>
+        <p:nvSpPr>
           <p:cNvPr id="2" name="Titelplatzhalter 1"/>
           <p:cNvSpPr>
             <a:spLocks noGrp="1"/>
@@ -1111,7 +1158,7 @@
           <a:p>
             <a:fld id="{FF5B2BAF-DF38-0A48-A798-0C06E514FD52}" type="datetimeFigureOut">
               <a:rPr lang="de-DE" smtClean="0"/>
-              <a:t>28.05.15</a:t>
+              <a:t>29.05.15</a:t>
             </a:fld>
             <a:endParaRPr lang="de-DE" dirty="0"/>
           </a:p>
@@ -2200,7 +2247,6 @@
               <a:rPr lang="de-DE" dirty="0"/>
               <a:t>.</a:t>
             </a:r>
-            <a:endParaRPr lang="de-DE" dirty="0"/>
           </a:p>
         </p:txBody>
       </p:sp>

</xml_diff>